<commit_message>
home page basic layout
</commit_message>
<xml_diff>
--- a/IBXWireframe.pptx
+++ b/IBXWireframe.pptx
@@ -110,7 +110,16 @@
       </a:defRPr>
     </a:lvl9pPr>
   </p:defaultTextStyle>
+  <p:extLst>
+    <p:ext uri="{EFAFB233-063F-42B5-8137-9DF3F51BA10A}">
+      <p15:sldGuideLst xmlns:p15="http://schemas.microsoft.com/office/powerpoint/2012/main"/>
+    </p:ext>
+  </p:extLst>
 </p:presentation>
+</file>
+
+<file path=ppt/revisionInfo.xml><?xml version="1.0" encoding="utf-8"?>
+<p1510:revInfo xmlns:a="http://schemas.openxmlformats.org/drawingml/2006/main" xmlns:r="http://schemas.openxmlformats.org/officeDocument/2006/relationships" xmlns:p1510="http://schemas.microsoft.com/office/powerpoint/2015/10/main"/>
 </file>
 
 <file path=ppt/slideLayouts/slideLayout1.xml><?xml version="1.0" encoding="utf-8"?>
@@ -244,7 +253,7 @@
           <a:p>
             <a:fld id="{1AED6C60-EA73-4228-8BD7-2004C3408E46}" type="datetimeFigureOut">
               <a:rPr lang="en-US" smtClean="0"/>
-              <a:t>12/25/2017</a:t>
+              <a:t>12/27/2017</a:t>
             </a:fld>
             <a:endParaRPr lang="en-US"/>
           </a:p>
@@ -414,7 +423,7 @@
           <a:p>
             <a:fld id="{1AED6C60-EA73-4228-8BD7-2004C3408E46}" type="datetimeFigureOut">
               <a:rPr lang="en-US" smtClean="0"/>
-              <a:t>12/25/2017</a:t>
+              <a:t>12/27/2017</a:t>
             </a:fld>
             <a:endParaRPr lang="en-US"/>
           </a:p>
@@ -594,7 +603,7 @@
           <a:p>
             <a:fld id="{1AED6C60-EA73-4228-8BD7-2004C3408E46}" type="datetimeFigureOut">
               <a:rPr lang="en-US" smtClean="0"/>
-              <a:t>12/25/2017</a:t>
+              <a:t>12/27/2017</a:t>
             </a:fld>
             <a:endParaRPr lang="en-US"/>
           </a:p>
@@ -764,7 +773,7 @@
           <a:p>
             <a:fld id="{1AED6C60-EA73-4228-8BD7-2004C3408E46}" type="datetimeFigureOut">
               <a:rPr lang="en-US" smtClean="0"/>
-              <a:t>12/25/2017</a:t>
+              <a:t>12/27/2017</a:t>
             </a:fld>
             <a:endParaRPr lang="en-US"/>
           </a:p>
@@ -1008,7 +1017,7 @@
           <a:p>
             <a:fld id="{1AED6C60-EA73-4228-8BD7-2004C3408E46}" type="datetimeFigureOut">
               <a:rPr lang="en-US" smtClean="0"/>
-              <a:t>12/25/2017</a:t>
+              <a:t>12/27/2017</a:t>
             </a:fld>
             <a:endParaRPr lang="en-US"/>
           </a:p>
@@ -1240,7 +1249,7 @@
           <a:p>
             <a:fld id="{1AED6C60-EA73-4228-8BD7-2004C3408E46}" type="datetimeFigureOut">
               <a:rPr lang="en-US" smtClean="0"/>
-              <a:t>12/25/2017</a:t>
+              <a:t>12/27/2017</a:t>
             </a:fld>
             <a:endParaRPr lang="en-US"/>
           </a:p>
@@ -1607,7 +1616,7 @@
           <a:p>
             <a:fld id="{1AED6C60-EA73-4228-8BD7-2004C3408E46}" type="datetimeFigureOut">
               <a:rPr lang="en-US" smtClean="0"/>
-              <a:t>12/25/2017</a:t>
+              <a:t>12/27/2017</a:t>
             </a:fld>
             <a:endParaRPr lang="en-US"/>
           </a:p>
@@ -1725,7 +1734,7 @@
           <a:p>
             <a:fld id="{1AED6C60-EA73-4228-8BD7-2004C3408E46}" type="datetimeFigureOut">
               <a:rPr lang="en-US" smtClean="0"/>
-              <a:t>12/25/2017</a:t>
+              <a:t>12/27/2017</a:t>
             </a:fld>
             <a:endParaRPr lang="en-US"/>
           </a:p>
@@ -1820,7 +1829,7 @@
           <a:p>
             <a:fld id="{1AED6C60-EA73-4228-8BD7-2004C3408E46}" type="datetimeFigureOut">
               <a:rPr lang="en-US" smtClean="0"/>
-              <a:t>12/25/2017</a:t>
+              <a:t>12/27/2017</a:t>
             </a:fld>
             <a:endParaRPr lang="en-US"/>
           </a:p>
@@ -2097,7 +2106,7 @@
           <a:p>
             <a:fld id="{1AED6C60-EA73-4228-8BD7-2004C3408E46}" type="datetimeFigureOut">
               <a:rPr lang="en-US" smtClean="0"/>
-              <a:t>12/25/2017</a:t>
+              <a:t>12/27/2017</a:t>
             </a:fld>
             <a:endParaRPr lang="en-US"/>
           </a:p>
@@ -2354,7 +2363,7 @@
           <a:p>
             <a:fld id="{1AED6C60-EA73-4228-8BD7-2004C3408E46}" type="datetimeFigureOut">
               <a:rPr lang="en-US" smtClean="0"/>
-              <a:t>12/25/2017</a:t>
+              <a:t>12/27/2017</a:t>
             </a:fld>
             <a:endParaRPr lang="en-US"/>
           </a:p>
@@ -2567,7 +2576,7 @@
           <a:p>
             <a:fld id="{1AED6C60-EA73-4228-8BD7-2004C3408E46}" type="datetimeFigureOut">
               <a:rPr lang="en-US" smtClean="0"/>
-              <a:t>12/25/2017</a:t>
+              <a:t>12/27/2017</a:t>
             </a:fld>
             <a:endParaRPr lang="en-US"/>
           </a:p>
@@ -3120,6 +3129,13 @@
               <a:t>Menu</a:t>
             </a:r>
           </a:p>
+          <a:p>
+            <a:pPr algn="ctr"/>
+            <a:r>
+              <a:rPr lang="en-US" dirty="0"/>
+              <a:t>[Static]</a:t>
+            </a:r>
+          </a:p>
         </p:txBody>
       </p:sp>
       <p:sp>

</xml_diff>

<commit_message>
created basic components of Products page
</commit_message>
<xml_diff>
--- a/IBXWireframe.pptx
+++ b/IBXWireframe.pptx
@@ -253,7 +253,7 @@
           <a:p>
             <a:fld id="{1AED6C60-EA73-4228-8BD7-2004C3408E46}" type="datetimeFigureOut">
               <a:rPr lang="en-US" smtClean="0"/>
-              <a:t>12/27/2017</a:t>
+              <a:t>1/1/2018</a:t>
             </a:fld>
             <a:endParaRPr lang="en-US"/>
           </a:p>
@@ -423,7 +423,7 @@
           <a:p>
             <a:fld id="{1AED6C60-EA73-4228-8BD7-2004C3408E46}" type="datetimeFigureOut">
               <a:rPr lang="en-US" smtClean="0"/>
-              <a:t>12/27/2017</a:t>
+              <a:t>1/1/2018</a:t>
             </a:fld>
             <a:endParaRPr lang="en-US"/>
           </a:p>
@@ -603,7 +603,7 @@
           <a:p>
             <a:fld id="{1AED6C60-EA73-4228-8BD7-2004C3408E46}" type="datetimeFigureOut">
               <a:rPr lang="en-US" smtClean="0"/>
-              <a:t>12/27/2017</a:t>
+              <a:t>1/1/2018</a:t>
             </a:fld>
             <a:endParaRPr lang="en-US"/>
           </a:p>
@@ -773,7 +773,7 @@
           <a:p>
             <a:fld id="{1AED6C60-EA73-4228-8BD7-2004C3408E46}" type="datetimeFigureOut">
               <a:rPr lang="en-US" smtClean="0"/>
-              <a:t>12/27/2017</a:t>
+              <a:t>1/1/2018</a:t>
             </a:fld>
             <a:endParaRPr lang="en-US"/>
           </a:p>
@@ -1017,7 +1017,7 @@
           <a:p>
             <a:fld id="{1AED6C60-EA73-4228-8BD7-2004C3408E46}" type="datetimeFigureOut">
               <a:rPr lang="en-US" smtClean="0"/>
-              <a:t>12/27/2017</a:t>
+              <a:t>1/1/2018</a:t>
             </a:fld>
             <a:endParaRPr lang="en-US"/>
           </a:p>
@@ -1249,7 +1249,7 @@
           <a:p>
             <a:fld id="{1AED6C60-EA73-4228-8BD7-2004C3408E46}" type="datetimeFigureOut">
               <a:rPr lang="en-US" smtClean="0"/>
-              <a:t>12/27/2017</a:t>
+              <a:t>1/1/2018</a:t>
             </a:fld>
             <a:endParaRPr lang="en-US"/>
           </a:p>
@@ -1616,7 +1616,7 @@
           <a:p>
             <a:fld id="{1AED6C60-EA73-4228-8BD7-2004C3408E46}" type="datetimeFigureOut">
               <a:rPr lang="en-US" smtClean="0"/>
-              <a:t>12/27/2017</a:t>
+              <a:t>1/1/2018</a:t>
             </a:fld>
             <a:endParaRPr lang="en-US"/>
           </a:p>
@@ -1734,7 +1734,7 @@
           <a:p>
             <a:fld id="{1AED6C60-EA73-4228-8BD7-2004C3408E46}" type="datetimeFigureOut">
               <a:rPr lang="en-US" smtClean="0"/>
-              <a:t>12/27/2017</a:t>
+              <a:t>1/1/2018</a:t>
             </a:fld>
             <a:endParaRPr lang="en-US"/>
           </a:p>
@@ -1829,7 +1829,7 @@
           <a:p>
             <a:fld id="{1AED6C60-EA73-4228-8BD7-2004C3408E46}" type="datetimeFigureOut">
               <a:rPr lang="en-US" smtClean="0"/>
-              <a:t>12/27/2017</a:t>
+              <a:t>1/1/2018</a:t>
             </a:fld>
             <a:endParaRPr lang="en-US"/>
           </a:p>
@@ -2106,7 +2106,7 @@
           <a:p>
             <a:fld id="{1AED6C60-EA73-4228-8BD7-2004C3408E46}" type="datetimeFigureOut">
               <a:rPr lang="en-US" smtClean="0"/>
-              <a:t>12/27/2017</a:t>
+              <a:t>1/1/2018</a:t>
             </a:fld>
             <a:endParaRPr lang="en-US"/>
           </a:p>
@@ -2363,7 +2363,7 @@
           <a:p>
             <a:fld id="{1AED6C60-EA73-4228-8BD7-2004C3408E46}" type="datetimeFigureOut">
               <a:rPr lang="en-US" smtClean="0"/>
-              <a:t>12/27/2017</a:t>
+              <a:t>1/1/2018</a:t>
             </a:fld>
             <a:endParaRPr lang="en-US"/>
           </a:p>
@@ -2576,7 +2576,7 @@
           <a:p>
             <a:fld id="{1AED6C60-EA73-4228-8BD7-2004C3408E46}" type="datetimeFigureOut">
               <a:rPr lang="en-US" smtClean="0"/>
-              <a:t>12/27/2017</a:t>
+              <a:t>1/1/2018</a:t>
             </a:fld>
             <a:endParaRPr lang="en-US"/>
           </a:p>
@@ -5260,8 +5260,8 @@
         </p:nvSpPr>
         <p:spPr>
           <a:xfrm>
-            <a:off x="2094271" y="3362633"/>
-            <a:ext cx="4454012" cy="7669161"/>
+            <a:off x="1769806" y="3362633"/>
+            <a:ext cx="5088194" cy="7831393"/>
           </a:xfrm>
           <a:prstGeom prst="rect">
             <a:avLst/>
@@ -5294,17 +5294,525 @@
           <a:lstStyle/>
           <a:p>
             <a:pPr algn="ctr"/>
-            <a:r>
-              <a:rPr lang="en-US" dirty="0">
+            <a:endParaRPr lang="en-US" dirty="0">
+              <a:solidFill>
+                <a:schemeClr val="tx1">
+                  <a:lumMod val="95000"/>
+                  <a:lumOff val="5000"/>
+                </a:schemeClr>
+              </a:solidFill>
+            </a:endParaRPr>
+          </a:p>
+        </p:txBody>
+      </p:sp>
+      <p:sp>
+        <p:nvSpPr>
+          <p:cNvPr id="3" name="TextBox 2">
+            <a:extLst>
+              <a:ext uri="{FF2B5EF4-FFF2-40B4-BE49-F238E27FC236}">
+                <a16:creationId xmlns:a16="http://schemas.microsoft.com/office/drawing/2014/main" id="{3E8FADFF-1280-4E7B-AF97-C8B588199D8F}"/>
+              </a:ext>
+            </a:extLst>
+          </p:cNvPr>
+          <p:cNvSpPr txBox="1"/>
+          <p:nvPr/>
+        </p:nvSpPr>
+        <p:spPr>
+          <a:xfrm>
+            <a:off x="2365477" y="3466485"/>
+            <a:ext cx="3911600" cy="369332"/>
+          </a:xfrm>
+          <a:prstGeom prst="rect">
+            <a:avLst/>
+          </a:prstGeom>
+          <a:noFill/>
+        </p:spPr>
+        <p:txBody>
+          <a:bodyPr wrap="square" rtlCol="0">
+            <a:spAutoFit/>
+          </a:bodyPr>
+          <a:lstStyle/>
+          <a:p>
+            <a:r>
+              <a:rPr lang="en-US" dirty="0"/>
+              <a:t>Products</a:t>
+            </a:r>
+          </a:p>
+        </p:txBody>
+      </p:sp>
+      <p:grpSp>
+        <p:nvGrpSpPr>
+          <p:cNvPr id="25" name="Group 24">
+            <a:extLst>
+              <a:ext uri="{FF2B5EF4-FFF2-40B4-BE49-F238E27FC236}">
+                <a16:creationId xmlns:a16="http://schemas.microsoft.com/office/drawing/2014/main" id="{EBFD5FD8-6100-4304-ABBC-2FAA183F1B16}"/>
+              </a:ext>
+            </a:extLst>
+          </p:cNvPr>
+          <p:cNvGrpSpPr/>
+          <p:nvPr/>
+        </p:nvGrpSpPr>
+        <p:grpSpPr>
+          <a:xfrm>
+            <a:off x="2568676" y="4815348"/>
+            <a:ext cx="3505201" cy="4591263"/>
+            <a:chOff x="2365477" y="4834193"/>
+            <a:chExt cx="3911600" cy="4591263"/>
+          </a:xfrm>
+        </p:grpSpPr>
+        <p:sp>
+          <p:nvSpPr>
+            <p:cNvPr id="18" name="Rectangle 17">
+              <a:extLst>
+                <a:ext uri="{FF2B5EF4-FFF2-40B4-BE49-F238E27FC236}">
+                  <a16:creationId xmlns:a16="http://schemas.microsoft.com/office/drawing/2014/main" id="{4B4E9275-1AE3-4807-AEDD-D6FCB7B4357C}"/>
+                </a:ext>
+              </a:extLst>
+            </p:cNvPr>
+            <p:cNvSpPr/>
+            <p:nvPr/>
+          </p:nvSpPr>
+          <p:spPr>
+            <a:xfrm>
+              <a:off x="2365477" y="4834193"/>
+              <a:ext cx="3911600" cy="265472"/>
+            </a:xfrm>
+            <a:prstGeom prst="rect">
+              <a:avLst/>
+            </a:prstGeom>
+            <a:solidFill>
+              <a:schemeClr val="bg2">
+                <a:lumMod val="75000"/>
+              </a:schemeClr>
+            </a:solidFill>
+            <a:ln>
+              <a:solidFill>
+                <a:schemeClr val="bg2">
+                  <a:lumMod val="75000"/>
+                </a:schemeClr>
+              </a:solidFill>
+            </a:ln>
+          </p:spPr>
+          <p:style>
+            <a:lnRef idx="2">
+              <a:schemeClr val="accent1">
+                <a:shade val="50000"/>
+              </a:schemeClr>
+            </a:lnRef>
+            <a:fillRef idx="1">
+              <a:schemeClr val="accent1"/>
+            </a:fillRef>
+            <a:effectRef idx="0">
+              <a:schemeClr val="accent1"/>
+            </a:effectRef>
+            <a:fontRef idx="minor">
+              <a:schemeClr val="lt1"/>
+            </a:fontRef>
+          </p:style>
+          <p:txBody>
+            <a:bodyPr rtlCol="0" anchor="ctr"/>
+            <a:lstStyle/>
+            <a:p>
+              <a:pPr algn="ctr"/>
+              <a:r>
+                <a:rPr lang="en-US" dirty="0"/>
+                <a:t>Search Filter</a:t>
+              </a:r>
+            </a:p>
+          </p:txBody>
+        </p:sp>
+        <p:sp>
+          <p:nvSpPr>
+            <p:cNvPr id="19" name="Rectangle 18">
+              <a:extLst>
+                <a:ext uri="{FF2B5EF4-FFF2-40B4-BE49-F238E27FC236}">
+                  <a16:creationId xmlns:a16="http://schemas.microsoft.com/office/drawing/2014/main" id="{F88941E0-5194-4531-BA4B-982D1B78AD15}"/>
+                </a:ext>
+              </a:extLst>
+            </p:cNvPr>
+            <p:cNvSpPr/>
+            <p:nvPr/>
+          </p:nvSpPr>
+          <p:spPr>
+            <a:xfrm>
+              <a:off x="2365477" y="5099263"/>
+              <a:ext cx="3911600" cy="4326193"/>
+            </a:xfrm>
+            <a:prstGeom prst="rect">
+              <a:avLst/>
+            </a:prstGeom>
+          </p:spPr>
+          <p:style>
+            <a:lnRef idx="2">
+              <a:schemeClr val="accent1">
+                <a:shade val="50000"/>
+              </a:schemeClr>
+            </a:lnRef>
+            <a:fillRef idx="1">
+              <a:schemeClr val="accent1"/>
+            </a:fillRef>
+            <a:effectRef idx="0">
+              <a:schemeClr val="accent1"/>
+            </a:effectRef>
+            <a:fontRef idx="minor">
+              <a:schemeClr val="lt1"/>
+            </a:fontRef>
+          </p:style>
+          <p:txBody>
+            <a:bodyPr rtlCol="0" anchor="ctr"/>
+            <a:lstStyle/>
+            <a:p>
+              <a:pPr algn="ctr"/>
+              <a:endParaRPr lang="en-US" dirty="0"/>
+            </a:p>
+          </p:txBody>
+        </p:sp>
+        <p:sp>
+          <p:nvSpPr>
+            <p:cNvPr id="20" name="Rectangle 19">
+              <a:extLst>
+                <a:ext uri="{FF2B5EF4-FFF2-40B4-BE49-F238E27FC236}">
+                  <a16:creationId xmlns:a16="http://schemas.microsoft.com/office/drawing/2014/main" id="{D3077474-1878-4B3C-84D6-DD869805006E}"/>
+                </a:ext>
+              </a:extLst>
+            </p:cNvPr>
+            <p:cNvSpPr/>
+            <p:nvPr/>
+          </p:nvSpPr>
+          <p:spPr>
+            <a:xfrm>
+              <a:off x="4559300" y="5099263"/>
+              <a:ext cx="1717777" cy="1993073"/>
+            </a:xfrm>
+            <a:prstGeom prst="rect">
+              <a:avLst/>
+            </a:prstGeom>
+            <a:solidFill>
+              <a:schemeClr val="tx2">
+                <a:lumMod val="20000"/>
+                <a:lumOff val="80000"/>
+              </a:schemeClr>
+            </a:solidFill>
+          </p:spPr>
+          <p:style>
+            <a:lnRef idx="2">
+              <a:schemeClr val="accent1">
+                <a:shade val="50000"/>
+              </a:schemeClr>
+            </a:lnRef>
+            <a:fillRef idx="1">
+              <a:schemeClr val="accent1"/>
+            </a:fillRef>
+            <a:effectRef idx="0">
+              <a:schemeClr val="accent1"/>
+            </a:effectRef>
+            <a:fontRef idx="minor">
+              <a:schemeClr val="lt1"/>
+            </a:fontRef>
+          </p:style>
+          <p:txBody>
+            <a:bodyPr rtlCol="0" anchor="ctr"/>
+            <a:lstStyle/>
+            <a:p>
+              <a:pPr algn="ctr"/>
+              <a:r>
+                <a:rPr lang="en-US" dirty="0">
+                  <a:solidFill>
+                    <a:schemeClr val="accent6">
+                      <a:lumMod val="75000"/>
+                    </a:schemeClr>
+                  </a:solidFill>
+                </a:rPr>
+                <a:t>Image</a:t>
+              </a:r>
+            </a:p>
+          </p:txBody>
+        </p:sp>
+        <p:sp>
+          <p:nvSpPr>
+            <p:cNvPr id="21" name="Rectangle 20">
+              <a:extLst>
+                <a:ext uri="{FF2B5EF4-FFF2-40B4-BE49-F238E27FC236}">
+                  <a16:creationId xmlns:a16="http://schemas.microsoft.com/office/drawing/2014/main" id="{7DC849B6-736A-4FFE-A8FA-68330BD5C8D0}"/>
+                </a:ext>
+              </a:extLst>
+            </p:cNvPr>
+            <p:cNvSpPr/>
+            <p:nvPr/>
+          </p:nvSpPr>
+          <p:spPr>
+            <a:xfrm>
+              <a:off x="2365477" y="5860027"/>
+              <a:ext cx="2193823" cy="884903"/>
+            </a:xfrm>
+            <a:prstGeom prst="rect">
+              <a:avLst/>
+            </a:prstGeom>
+            <a:solidFill>
+              <a:schemeClr val="tx1">
+                <a:lumMod val="65000"/>
+                <a:lumOff val="35000"/>
+              </a:schemeClr>
+            </a:solidFill>
+          </p:spPr>
+          <p:style>
+            <a:lnRef idx="2">
+              <a:schemeClr val="accent1">
+                <a:shade val="50000"/>
+              </a:schemeClr>
+            </a:lnRef>
+            <a:fillRef idx="1">
+              <a:schemeClr val="accent1"/>
+            </a:fillRef>
+            <a:effectRef idx="0">
+              <a:schemeClr val="accent1"/>
+            </a:effectRef>
+            <a:fontRef idx="minor">
+              <a:schemeClr val="lt1"/>
+            </a:fontRef>
+          </p:style>
+          <p:txBody>
+            <a:bodyPr rtlCol="0" anchor="ctr"/>
+            <a:lstStyle/>
+            <a:p>
+              <a:pPr algn="ctr"/>
+              <a:r>
+                <a:rPr lang="en-US" dirty="0"/>
+                <a:t>Name</a:t>
+              </a:r>
+            </a:p>
+          </p:txBody>
+        </p:sp>
+        <p:grpSp>
+          <p:nvGrpSpPr>
+            <p:cNvPr id="24" name="Group 23">
+              <a:extLst>
+                <a:ext uri="{FF2B5EF4-FFF2-40B4-BE49-F238E27FC236}">
+                  <a16:creationId xmlns:a16="http://schemas.microsoft.com/office/drawing/2014/main" id="{75D1DE91-02E0-4958-95C3-38503E01F248}"/>
+                </a:ext>
+              </a:extLst>
+            </p:cNvPr>
+            <p:cNvGrpSpPr/>
+            <p:nvPr/>
+          </p:nvGrpSpPr>
+          <p:grpSpPr>
+            <a:xfrm>
+              <a:off x="2365477" y="6744930"/>
+              <a:ext cx="3911600" cy="2680526"/>
+              <a:chOff x="2365477" y="6744930"/>
+              <a:chExt cx="3911600" cy="2680526"/>
+            </a:xfrm>
+          </p:grpSpPr>
+          <p:sp>
+            <p:nvSpPr>
+              <p:cNvPr id="22" name="Rectangle 21">
+                <a:extLst>
+                  <a:ext uri="{FF2B5EF4-FFF2-40B4-BE49-F238E27FC236}">
+                    <a16:creationId xmlns:a16="http://schemas.microsoft.com/office/drawing/2014/main" id="{2FF5629D-A47A-4E2D-AD9E-DFD378F4139C}"/>
+                  </a:ext>
+                </a:extLst>
+              </p:cNvPr>
+              <p:cNvSpPr/>
+              <p:nvPr/>
+            </p:nvSpPr>
+            <p:spPr>
+              <a:xfrm>
+                <a:off x="2365477" y="6744930"/>
+                <a:ext cx="2193823" cy="2680526"/>
+              </a:xfrm>
+              <a:prstGeom prst="rect">
+                <a:avLst/>
+              </a:prstGeom>
+              <a:solidFill>
+                <a:schemeClr val="bg2">
+                  <a:lumMod val="75000"/>
+                </a:schemeClr>
+              </a:solidFill>
+              <a:ln>
                 <a:solidFill>
-                  <a:schemeClr val="tx1">
-                    <a:lumMod val="95000"/>
-                    <a:lumOff val="5000"/>
+                  <a:schemeClr val="bg2">
+                    <a:lumMod val="75000"/>
                   </a:schemeClr>
                 </a:solidFill>
-              </a:rPr>
-              <a:t>Products</a:t>
-            </a:r>
+              </a:ln>
+            </p:spPr>
+            <p:style>
+              <a:lnRef idx="2">
+                <a:schemeClr val="accent1">
+                  <a:shade val="50000"/>
+                </a:schemeClr>
+              </a:lnRef>
+              <a:fillRef idx="1">
+                <a:schemeClr val="accent1"/>
+              </a:fillRef>
+              <a:effectRef idx="0">
+                <a:schemeClr val="accent1"/>
+              </a:effectRef>
+              <a:fontRef idx="minor">
+                <a:schemeClr val="lt1"/>
+              </a:fontRef>
+            </p:style>
+            <p:txBody>
+              <a:bodyPr rtlCol="0" anchor="ctr"/>
+              <a:lstStyle/>
+              <a:p>
+                <a:pPr algn="ctr"/>
+                <a:r>
+                  <a:rPr lang="en-US" dirty="0"/>
+                  <a:t>Description</a:t>
+                </a:r>
+              </a:p>
+            </p:txBody>
+          </p:sp>
+          <p:sp>
+            <p:nvSpPr>
+              <p:cNvPr id="23" name="Rectangle 22">
+                <a:extLst>
+                  <a:ext uri="{FF2B5EF4-FFF2-40B4-BE49-F238E27FC236}">
+                    <a16:creationId xmlns:a16="http://schemas.microsoft.com/office/drawing/2014/main" id="{4D3505F7-AB97-4C15-8ABA-E234BD8930B8}"/>
+                  </a:ext>
+                </a:extLst>
+              </p:cNvPr>
+              <p:cNvSpPr/>
+              <p:nvPr/>
+            </p:nvSpPr>
+            <p:spPr>
+              <a:xfrm>
+                <a:off x="4559300" y="7092336"/>
+                <a:ext cx="1717777" cy="2333120"/>
+              </a:xfrm>
+              <a:prstGeom prst="rect">
+                <a:avLst/>
+              </a:prstGeom>
+              <a:solidFill>
+                <a:schemeClr val="bg2">
+                  <a:lumMod val="75000"/>
+                </a:schemeClr>
+              </a:solidFill>
+              <a:ln>
+                <a:solidFill>
+                  <a:schemeClr val="bg2">
+                    <a:lumMod val="75000"/>
+                  </a:schemeClr>
+                </a:solidFill>
+              </a:ln>
+            </p:spPr>
+            <p:style>
+              <a:lnRef idx="2">
+                <a:schemeClr val="accent1">
+                  <a:shade val="50000"/>
+                </a:schemeClr>
+              </a:lnRef>
+              <a:fillRef idx="1">
+                <a:schemeClr val="accent1"/>
+              </a:fillRef>
+              <a:effectRef idx="0">
+                <a:schemeClr val="accent1"/>
+              </a:effectRef>
+              <a:fontRef idx="minor">
+                <a:schemeClr val="lt1"/>
+              </a:fontRef>
+            </p:style>
+            <p:txBody>
+              <a:bodyPr rtlCol="0" anchor="ctr"/>
+              <a:lstStyle/>
+              <a:p>
+                <a:pPr algn="ctr"/>
+                <a:endParaRPr lang="en-US"/>
+              </a:p>
+            </p:txBody>
+          </p:sp>
+        </p:grpSp>
+      </p:grpSp>
+      <p:sp>
+        <p:nvSpPr>
+          <p:cNvPr id="26" name="Arrow: Right 25">
+            <a:extLst>
+              <a:ext uri="{FF2B5EF4-FFF2-40B4-BE49-F238E27FC236}">
+                <a16:creationId xmlns:a16="http://schemas.microsoft.com/office/drawing/2014/main" id="{79161470-2FE7-49A8-A2A6-B01A5AE663DF}"/>
+              </a:ext>
+            </a:extLst>
+          </p:cNvPr>
+          <p:cNvSpPr/>
+          <p:nvPr/>
+        </p:nvSpPr>
+        <p:spPr>
+          <a:xfrm>
+            <a:off x="6309964" y="6849807"/>
+            <a:ext cx="381000" cy="347406"/>
+          </a:xfrm>
+          <a:prstGeom prst="rightArrow">
+            <a:avLst/>
+          </a:prstGeom>
+        </p:spPr>
+        <p:style>
+          <a:lnRef idx="2">
+            <a:schemeClr val="accent1">
+              <a:shade val="50000"/>
+            </a:schemeClr>
+          </a:lnRef>
+          <a:fillRef idx="1">
+            <a:schemeClr val="accent1"/>
+          </a:fillRef>
+          <a:effectRef idx="0">
+            <a:schemeClr val="accent1"/>
+          </a:effectRef>
+          <a:fontRef idx="minor">
+            <a:schemeClr val="lt1"/>
+          </a:fontRef>
+        </p:style>
+        <p:txBody>
+          <a:bodyPr rtlCol="0" anchor="ctr"/>
+          <a:lstStyle/>
+          <a:p>
+            <a:pPr algn="ctr"/>
+            <a:endParaRPr lang="en-US"/>
+          </a:p>
+        </p:txBody>
+      </p:sp>
+      <p:sp>
+        <p:nvSpPr>
+          <p:cNvPr id="27" name="Arrow: Right 26">
+            <a:extLst>
+              <a:ext uri="{FF2B5EF4-FFF2-40B4-BE49-F238E27FC236}">
+                <a16:creationId xmlns:a16="http://schemas.microsoft.com/office/drawing/2014/main" id="{CC88F0DD-0BF6-4831-B144-E483E42B16A5}"/>
+              </a:ext>
+            </a:extLst>
+          </p:cNvPr>
+          <p:cNvSpPr/>
+          <p:nvPr/>
+        </p:nvSpPr>
+        <p:spPr>
+          <a:xfrm rot="10800000">
+            <a:off x="1951589" y="6849807"/>
+            <a:ext cx="381000" cy="347406"/>
+          </a:xfrm>
+          <a:prstGeom prst="rightArrow">
+            <a:avLst/>
+          </a:prstGeom>
+        </p:spPr>
+        <p:style>
+          <a:lnRef idx="2">
+            <a:schemeClr val="accent1">
+              <a:shade val="50000"/>
+            </a:schemeClr>
+          </a:lnRef>
+          <a:fillRef idx="1">
+            <a:schemeClr val="accent1"/>
+          </a:fillRef>
+          <a:effectRef idx="0">
+            <a:schemeClr val="accent1"/>
+          </a:effectRef>
+          <a:fontRef idx="minor">
+            <a:schemeClr val="lt1"/>
+          </a:fontRef>
+        </p:style>
+        <p:txBody>
+          <a:bodyPr rtlCol="0" anchor="ctr"/>
+          <a:lstStyle/>
+          <a:p>
+            <a:pPr algn="ctr"/>
+            <a:endParaRPr lang="en-US"/>
           </a:p>
         </p:txBody>
       </p:sp>

</xml_diff>